<commit_message>
Issue : 151117_01 Mockup, PPT, UML 추가
</commit_message>
<xml_diff>
--- a/etc/pt/IKATool_151115_02.pptx
+++ b/etc/pt/IKATool_151115_02.pptx
@@ -5,25 +5,26 @@
     <p:sldMasterId id="2147483648" r:id="rId1"/>
   </p:sldMasterIdLst>
   <p:notesMasterIdLst>
-    <p:notesMasterId r:id="rId18"/>
+    <p:notesMasterId r:id="rId19"/>
   </p:notesMasterIdLst>
   <p:sldIdLst>
     <p:sldId id="257" r:id="rId2"/>
     <p:sldId id="362" r:id="rId3"/>
-    <p:sldId id="365" r:id="rId4"/>
-    <p:sldId id="364" r:id="rId5"/>
-    <p:sldId id="363" r:id="rId6"/>
-    <p:sldId id="361" r:id="rId7"/>
-    <p:sldId id="358" r:id="rId8"/>
-    <p:sldId id="359" r:id="rId9"/>
-    <p:sldId id="360" r:id="rId10"/>
-    <p:sldId id="355" r:id="rId11"/>
-    <p:sldId id="356" r:id="rId12"/>
-    <p:sldId id="351" r:id="rId13"/>
-    <p:sldId id="346" r:id="rId14"/>
-    <p:sldId id="347" r:id="rId15"/>
-    <p:sldId id="348" r:id="rId16"/>
-    <p:sldId id="349" r:id="rId17"/>
+    <p:sldId id="366" r:id="rId4"/>
+    <p:sldId id="365" r:id="rId5"/>
+    <p:sldId id="364" r:id="rId6"/>
+    <p:sldId id="363" r:id="rId7"/>
+    <p:sldId id="361" r:id="rId8"/>
+    <p:sldId id="358" r:id="rId9"/>
+    <p:sldId id="359" r:id="rId10"/>
+    <p:sldId id="360" r:id="rId11"/>
+    <p:sldId id="355" r:id="rId12"/>
+    <p:sldId id="356" r:id="rId13"/>
+    <p:sldId id="351" r:id="rId14"/>
+    <p:sldId id="346" r:id="rId15"/>
+    <p:sldId id="347" r:id="rId16"/>
+    <p:sldId id="348" r:id="rId17"/>
+    <p:sldId id="349" r:id="rId18"/>
   </p:sldIdLst>
   <p:sldSz cx="12192000" cy="6858000"/>
   <p:notesSz cx="6858000" cy="9144000"/>
@@ -212,7 +213,7 @@
           <a:p>
             <a:fld id="{854058B0-8162-864B-AE86-8B8874D98977}" type="datetimeFigureOut">
               <a:rPr lang="en-US" smtClean="0"/>
-              <a:t>11/15/15</a:t>
+              <a:t>11/16/15</a:t>
             </a:fld>
             <a:endParaRPr lang="en-US"/>
           </a:p>
@@ -696,7 +697,7 @@
           <a:p>
             <a:fld id="{2CC12CED-D809-214C-AA93-35F0D79786A5}" type="datetimeFigureOut">
               <a:rPr lang="en-US" smtClean="0"/>
-              <a:t>11/15/15</a:t>
+              <a:t>11/16/15</a:t>
             </a:fld>
             <a:endParaRPr lang="en-US"/>
           </a:p>
@@ -866,7 +867,7 @@
           <a:p>
             <a:fld id="{2CC12CED-D809-214C-AA93-35F0D79786A5}" type="datetimeFigureOut">
               <a:rPr lang="en-US" smtClean="0"/>
-              <a:t>11/15/15</a:t>
+              <a:t>11/16/15</a:t>
             </a:fld>
             <a:endParaRPr lang="en-US"/>
           </a:p>
@@ -1046,7 +1047,7 @@
           <a:p>
             <a:fld id="{2CC12CED-D809-214C-AA93-35F0D79786A5}" type="datetimeFigureOut">
               <a:rPr lang="en-US" smtClean="0"/>
-              <a:t>11/15/15</a:t>
+              <a:t>11/16/15</a:t>
             </a:fld>
             <a:endParaRPr lang="en-US"/>
           </a:p>
@@ -2159,7 +2160,7 @@
           <a:p>
             <a:fld id="{2CC12CED-D809-214C-AA93-35F0D79786A5}" type="datetimeFigureOut">
               <a:rPr lang="en-US" smtClean="0"/>
-              <a:t>11/15/15</a:t>
+              <a:t>11/16/15</a:t>
             </a:fld>
             <a:endParaRPr lang="en-US"/>
           </a:p>
@@ -2405,7 +2406,7 @@
           <a:p>
             <a:fld id="{2CC12CED-D809-214C-AA93-35F0D79786A5}" type="datetimeFigureOut">
               <a:rPr lang="en-US" smtClean="0"/>
-              <a:t>11/15/15</a:t>
+              <a:t>11/16/15</a:t>
             </a:fld>
             <a:endParaRPr lang="en-US"/>
           </a:p>
@@ -2637,7 +2638,7 @@
           <a:p>
             <a:fld id="{2CC12CED-D809-214C-AA93-35F0D79786A5}" type="datetimeFigureOut">
               <a:rPr lang="en-US" smtClean="0"/>
-              <a:t>11/15/15</a:t>
+              <a:t>11/16/15</a:t>
             </a:fld>
             <a:endParaRPr lang="en-US"/>
           </a:p>
@@ -3004,7 +3005,7 @@
           <a:p>
             <a:fld id="{2CC12CED-D809-214C-AA93-35F0D79786A5}" type="datetimeFigureOut">
               <a:rPr lang="en-US" smtClean="0"/>
-              <a:t>11/15/15</a:t>
+              <a:t>11/16/15</a:t>
             </a:fld>
             <a:endParaRPr lang="en-US"/>
           </a:p>
@@ -3122,7 +3123,7 @@
           <a:p>
             <a:fld id="{2CC12CED-D809-214C-AA93-35F0D79786A5}" type="datetimeFigureOut">
               <a:rPr lang="en-US" smtClean="0"/>
-              <a:t>11/15/15</a:t>
+              <a:t>11/16/15</a:t>
             </a:fld>
             <a:endParaRPr lang="en-US"/>
           </a:p>
@@ -3217,7 +3218,7 @@
           <a:p>
             <a:fld id="{2CC12CED-D809-214C-AA93-35F0D79786A5}" type="datetimeFigureOut">
               <a:rPr lang="en-US" smtClean="0"/>
-              <a:t>11/15/15</a:t>
+              <a:t>11/16/15</a:t>
             </a:fld>
             <a:endParaRPr lang="en-US"/>
           </a:p>
@@ -3494,7 +3495,7 @@
           <a:p>
             <a:fld id="{2CC12CED-D809-214C-AA93-35F0D79786A5}" type="datetimeFigureOut">
               <a:rPr lang="en-US" smtClean="0"/>
-              <a:t>11/15/15</a:t>
+              <a:t>11/16/15</a:t>
             </a:fld>
             <a:endParaRPr lang="en-US"/>
           </a:p>
@@ -3747,7 +3748,7 @@
           <a:p>
             <a:fld id="{2CC12CED-D809-214C-AA93-35F0D79786A5}" type="datetimeFigureOut">
               <a:rPr lang="en-US" smtClean="0"/>
-              <a:t>11/15/15</a:t>
+              <a:t>11/16/15</a:t>
             </a:fld>
             <a:endParaRPr lang="en-US"/>
           </a:p>
@@ -3960,7 +3961,7 @@
           <a:p>
             <a:fld id="{2CC12CED-D809-214C-AA93-35F0D79786A5}" type="datetimeFigureOut">
               <a:rPr lang="en-US" smtClean="0"/>
-              <a:t>11/15/15</a:t>
+              <a:t>11/16/15</a:t>
             </a:fld>
             <a:endParaRPr lang="en-US"/>
           </a:p>
@@ -4414,13 +4415,8 @@
           <a:p>
             <a:r>
               <a:rPr lang="en-US" altLang="ko-KR" dirty="0" smtClean="0"/>
-              <a:t>2015. 11. </a:t>
-            </a:r>
-            <a:r>
-              <a:rPr lang="en-US" altLang="ko-KR" dirty="0" smtClean="0"/>
-              <a:t>15</a:t>
-            </a:r>
-            <a:endParaRPr lang="en-US" altLang="ko-KR" dirty="0" smtClean="0"/>
+              <a:t>2015. 11. 15</a:t>
+            </a:r>
           </a:p>
           <a:p>
             <a:endParaRPr lang="en-US" altLang="ko-KR" dirty="0"/>
@@ -4505,6 +4501,108 @@
 </file>
 
 <file path=ppt/slides/slide10.xml><?xml version="1.0" encoding="utf-8"?>
+<p:sld xmlns:a="http://schemas.openxmlformats.org/drawingml/2006/main" xmlns:r="http://schemas.openxmlformats.org/officeDocument/2006/relationships" xmlns:p="http://schemas.openxmlformats.org/presentationml/2006/main">
+  <p:cSld>
+    <p:spTree>
+      <p:nvGrpSpPr>
+        <p:cNvPr id="1" name=""/>
+        <p:cNvGrpSpPr/>
+        <p:nvPr/>
+      </p:nvGrpSpPr>
+      <p:grpSpPr>
+        <a:xfrm>
+          <a:off x="0" y="0"/>
+          <a:ext cx="0" cy="0"/>
+          <a:chOff x="0" y="0"/>
+          <a:chExt cx="0" cy="0"/>
+        </a:xfrm>
+      </p:grpSpPr>
+      <p:sp>
+        <p:nvSpPr>
+          <p:cNvPr id="2" name="제목 1"/>
+          <p:cNvSpPr>
+            <a:spLocks noGrp="1"/>
+          </p:cNvSpPr>
+          <p:nvPr>
+            <p:ph type="title"/>
+          </p:nvPr>
+        </p:nvSpPr>
+        <p:spPr/>
+        <p:txBody>
+          <a:bodyPr/>
+          <a:lstStyle/>
+          <a:p>
+            <a:r>
+              <a:rPr lang="en-US" altLang="ko-KR" dirty="0" smtClean="0"/>
+              <a:t>GUI </a:t>
+            </a:r>
+            <a:r>
+              <a:rPr lang="ko-KR" altLang="en-US" dirty="0" smtClean="0"/>
+              <a:t>가이드 라인 </a:t>
+            </a:r>
+            <a:r>
+              <a:rPr lang="en-US" altLang="ko-KR" dirty="0" err="1" smtClean="0"/>
+              <a:t>Ver</a:t>
+            </a:r>
+            <a:r>
+              <a:rPr lang="en-US" altLang="ko-KR" dirty="0" smtClean="0"/>
+              <a:t> 0.3 [3]</a:t>
+            </a:r>
+            <a:endParaRPr lang="ko-KR" altLang="en-US" dirty="0"/>
+          </a:p>
+        </p:txBody>
+      </p:sp>
+      <p:pic>
+        <p:nvPicPr>
+          <p:cNvPr id="4" name="Picture 3"/>
+          <p:cNvPicPr>
+            <a:picLocks noChangeAspect="1"/>
+          </p:cNvPicPr>
+          <p:nvPr/>
+        </p:nvPicPr>
+        <p:blipFill>
+          <a:blip r:embed="rId2">
+            <a:extLst>
+              <a:ext uri="{28A0092B-C50C-407E-A947-70E740481C1C}">
+                <a14:useLocalDpi xmlns:a14="http://schemas.microsoft.com/office/drawing/2010/main" val="0"/>
+              </a:ext>
+            </a:extLst>
+          </a:blip>
+          <a:stretch>
+            <a:fillRect/>
+          </a:stretch>
+        </p:blipFill>
+        <p:spPr>
+          <a:xfrm>
+            <a:off x="2730500" y="1562100"/>
+            <a:ext cx="6718300" cy="3721100"/>
+          </a:xfrm>
+          <a:prstGeom prst="rect">
+            <a:avLst/>
+          </a:prstGeom>
+        </p:spPr>
+      </p:pic>
+    </p:spTree>
+    <p:extLst>
+      <p:ext uri="{BB962C8B-B14F-4D97-AF65-F5344CB8AC3E}">
+        <p14:creationId xmlns:p14="http://schemas.microsoft.com/office/powerpoint/2010/main" val="498777856"/>
+      </p:ext>
+    </p:extLst>
+  </p:cSld>
+  <p:clrMapOvr>
+    <a:masterClrMapping/>
+  </p:clrMapOvr>
+  <p:timing>
+    <p:tnLst>
+      <p:par>
+        <p:cTn id="1" dur="indefinite" restart="never" nodeType="tmRoot"/>
+      </p:par>
+    </p:tnLst>
+  </p:timing>
+</p:sld>
+</file>
+
+<file path=ppt/slides/slide11.xml><?xml version="1.0" encoding="utf-8"?>
 <p:sld xmlns:a="http://schemas.openxmlformats.org/drawingml/2006/main" xmlns:r="http://schemas.openxmlformats.org/officeDocument/2006/relationships" xmlns:p="http://schemas.openxmlformats.org/presentationml/2006/main">
   <p:cSld>
     <p:spTree>
@@ -4662,7 +4760,7 @@
 </p:sld>
 </file>
 
-<file path=ppt/slides/slide11.xml><?xml version="1.0" encoding="utf-8"?>
+<file path=ppt/slides/slide12.xml><?xml version="1.0" encoding="utf-8"?>
 <p:sld xmlns:a="http://schemas.openxmlformats.org/drawingml/2006/main" xmlns:r="http://schemas.openxmlformats.org/officeDocument/2006/relationships" xmlns:p="http://schemas.openxmlformats.org/presentationml/2006/main">
   <p:cSld>
     <p:spTree>
@@ -5564,7 +5662,7 @@
 </p:sld>
 </file>
 
-<file path=ppt/slides/slide12.xml><?xml version="1.0" encoding="utf-8"?>
+<file path=ppt/slides/slide13.xml><?xml version="1.0" encoding="utf-8"?>
 <p:sld xmlns:a="http://schemas.openxmlformats.org/drawingml/2006/main" xmlns:r="http://schemas.openxmlformats.org/officeDocument/2006/relationships" xmlns:p="http://schemas.openxmlformats.org/presentationml/2006/main">
   <p:cSld>
     <p:spTree>
@@ -5700,7 +5798,7 @@
 </p:sld>
 </file>
 
-<file path=ppt/slides/slide13.xml><?xml version="1.0" encoding="utf-8"?>
+<file path=ppt/slides/slide14.xml><?xml version="1.0" encoding="utf-8"?>
 <p:sld xmlns:a="http://schemas.openxmlformats.org/drawingml/2006/main" xmlns:r="http://schemas.openxmlformats.org/officeDocument/2006/relationships" xmlns:p="http://schemas.openxmlformats.org/presentationml/2006/main">
   <p:cSld>
     <p:spTree>
@@ -6030,7 +6128,7 @@
 </p:sld>
 </file>
 
-<file path=ppt/slides/slide14.xml><?xml version="1.0" encoding="utf-8"?>
+<file path=ppt/slides/slide15.xml><?xml version="1.0" encoding="utf-8"?>
 <p:sld xmlns:a="http://schemas.openxmlformats.org/drawingml/2006/main" xmlns:r="http://schemas.openxmlformats.org/officeDocument/2006/relationships" xmlns:p="http://schemas.openxmlformats.org/presentationml/2006/main">
   <p:cSld>
     <p:spTree>
@@ -6636,7 +6734,7 @@
 </p:sld>
 </file>
 
-<file path=ppt/slides/slide15.xml><?xml version="1.0" encoding="utf-8"?>
+<file path=ppt/slides/slide16.xml><?xml version="1.0" encoding="utf-8"?>
 <p:sld xmlns:a="http://schemas.openxmlformats.org/drawingml/2006/main" xmlns:r="http://schemas.openxmlformats.org/officeDocument/2006/relationships" xmlns:p="http://schemas.openxmlformats.org/presentationml/2006/main">
   <p:cSld>
     <p:spTree>
@@ -6987,7 +7085,7 @@
 </p:sld>
 </file>
 
-<file path=ppt/slides/slide16.xml><?xml version="1.0" encoding="utf-8"?>
+<file path=ppt/slides/slide17.xml><?xml version="1.0" encoding="utf-8"?>
 <p:sld xmlns:a="http://schemas.openxmlformats.org/drawingml/2006/main" xmlns:r="http://schemas.openxmlformats.org/officeDocument/2006/relationships" xmlns:p="http://schemas.openxmlformats.org/presentationml/2006/main">
   <p:cSld>
     <p:spTree>
@@ -7817,8 +7915,12 @@
           <a:lstStyle/>
           <a:p>
             <a:r>
+              <a:rPr lang="en-US" altLang="ko-KR" dirty="0" err="1" smtClean="0"/>
+              <a:t>StringValue</a:t>
+            </a:r>
+            <a:r>
               <a:rPr lang="en-US" altLang="ko-KR" dirty="0" smtClean="0"/>
-              <a:t>To-do Lists</a:t>
+              <a:t> Range</a:t>
             </a:r>
             <a:endParaRPr lang="ko-KR" altLang="en-US" dirty="0"/>
           </a:p>
@@ -7826,142 +7928,45 @@
       </p:sp>
       <p:sp>
         <p:nvSpPr>
-          <p:cNvPr id="5" name="TextBox 4"/>
-          <p:cNvSpPr txBox="1"/>
+          <p:cNvPr id="3" name="직사각형 2"/>
+          <p:cNvSpPr/>
           <p:nvPr/>
         </p:nvSpPr>
         <p:spPr>
           <a:xfrm>
-            <a:off x="1145059" y="1169718"/>
-            <a:ext cx="7332585" cy="2000548"/>
+            <a:off x="1874520" y="2070463"/>
+            <a:ext cx="2037806" cy="783771"/>
           </a:xfrm>
           <a:prstGeom prst="rect">
             <a:avLst/>
           </a:prstGeom>
-          <a:noFill/>
         </p:spPr>
-        <p:txBody>
-          <a:bodyPr wrap="none" rtlCol="0">
-            <a:spAutoFit/>
-          </a:bodyPr>
-          <a:lstStyle/>
-          <a:p>
-            <a:endParaRPr lang="ko-KR" altLang="en-US" sz="2400" dirty="0" smtClean="0"/>
-          </a:p>
-          <a:p>
-            <a:pPr marL="285750" indent="-285750">
-              <a:buFont typeface="Arial" charset="0"/>
-              <a:buChar char="•"/>
-            </a:pPr>
-            <a:r>
-              <a:rPr lang="ko-KR" altLang="en-US" sz="2000" dirty="0" smtClean="0"/>
-              <a:t>환자 </a:t>
-            </a:r>
-            <a:r>
-              <a:rPr lang="en-US" sz="2000" dirty="0" smtClean="0"/>
-              <a:t>Data</a:t>
-            </a:r>
-            <a:r>
-              <a:rPr lang="ko-KR" altLang="en-US" sz="2000" dirty="0" smtClean="0"/>
-              <a:t>를 위한</a:t>
-            </a:r>
-            <a:r>
-              <a:rPr lang="en-US" sz="2000" dirty="0" smtClean="0"/>
-              <a:t> Parser</a:t>
-            </a:r>
-            <a:r>
-              <a:rPr lang="ko-KR" altLang="en-US" sz="2000" dirty="0" smtClean="0"/>
-              <a:t> 프로그램 제작 필요</a:t>
-            </a:r>
-          </a:p>
-          <a:p>
-            <a:pPr marL="285750" indent="-285750">
-              <a:buFont typeface="Arial" charset="0"/>
-              <a:buChar char="•"/>
-            </a:pPr>
-            <a:r>
-              <a:rPr lang="en-US" sz="2000" dirty="0" smtClean="0"/>
-              <a:t>Rule Editor</a:t>
-            </a:r>
-            <a:r>
-              <a:rPr lang="ko-KR" altLang="en-US" sz="2000" dirty="0" smtClean="0"/>
-              <a:t> 부분에서 </a:t>
-            </a:r>
-            <a:r>
-              <a:rPr lang="en-US" altLang="ko-KR" sz="2000" dirty="0" smtClean="0"/>
-              <a:t>Rule Auto Completion </a:t>
-            </a:r>
-            <a:r>
-              <a:rPr lang="ko-KR" altLang="en-US" sz="2000" dirty="0" smtClean="0"/>
-              <a:t>관련 부분 수정 필요</a:t>
-            </a:r>
-          </a:p>
-          <a:p>
-            <a:pPr marL="285750" indent="-285750">
-              <a:buFont typeface="Arial" charset="0"/>
-              <a:buChar char="•"/>
-            </a:pPr>
-            <a:r>
-              <a:rPr lang="en-US" sz="2000" dirty="0" err="1" smtClean="0"/>
-              <a:t>TestItem</a:t>
-            </a:r>
-            <a:r>
-              <a:rPr lang="en-US" altLang="ko-KR" sz="2000" dirty="0" smtClean="0"/>
-              <a:t>(Atom)</a:t>
-            </a:r>
-            <a:r>
-              <a:rPr lang="ko-KR" altLang="en-US" sz="2000" dirty="0" smtClean="0"/>
-              <a:t> 별 </a:t>
-            </a:r>
-            <a:r>
-              <a:rPr lang="en-US" altLang="ko-KR" sz="2000" dirty="0" err="1" smtClean="0"/>
-              <a:t>StringValue</a:t>
-            </a:r>
-            <a:r>
-              <a:rPr lang="ko-KR" altLang="en-US" sz="2000" dirty="0" smtClean="0"/>
-              <a:t>에 대한 정의 필요</a:t>
-            </a:r>
-          </a:p>
-          <a:p>
-            <a:pPr marL="285750" indent="-285750">
-              <a:buFont typeface="Arial" charset="0"/>
-              <a:buChar char="•"/>
-            </a:pPr>
-            <a:r>
-              <a:rPr lang="ko-KR" altLang="en-US" sz="2000" dirty="0" smtClean="0"/>
-              <a:t>작성자 정보를 </a:t>
-            </a:r>
-            <a:r>
-              <a:rPr lang="en-US" altLang="ko-KR" sz="2000" dirty="0" smtClean="0"/>
-              <a:t>Application</a:t>
-            </a:r>
-            <a:r>
-              <a:rPr lang="ko-KR" altLang="en-US" sz="2000" dirty="0" smtClean="0"/>
-              <a:t> 실행시 입력받을 수 있도록 수정</a:t>
-            </a:r>
-          </a:p>
-          <a:p>
-            <a:pPr marL="285750" indent="-285750">
-              <a:buFont typeface="Arial" charset="0"/>
-              <a:buChar char="•"/>
-            </a:pPr>
-            <a:r>
-              <a:rPr lang="en-US" sz="2000" dirty="0" smtClean="0"/>
-              <a:t> </a:t>
-            </a:r>
-            <a:r>
-              <a:rPr lang="en-US" sz="2000" dirty="0" err="1" smtClean="0"/>
-              <a:t>GraphView</a:t>
-            </a:r>
-            <a:r>
-              <a:rPr lang="en-US" sz="2000" dirty="0" smtClean="0"/>
-              <a:t> </a:t>
-            </a:r>
-            <a:r>
-              <a:rPr lang="ko-KR" altLang="en-US" sz="2000" dirty="0" smtClean="0"/>
-              <a:t>추가</a:t>
-            </a:r>
-            <a:endParaRPr lang="en-US" sz="2400" dirty="0"/>
+        <p:style>
+          <a:lnRef idx="2">
+            <a:schemeClr val="accent1">
+              <a:shade val="50000"/>
+            </a:schemeClr>
+          </a:lnRef>
+          <a:fillRef idx="1">
+            <a:schemeClr val="accent1"/>
+          </a:fillRef>
+          <a:effectRef idx="0">
+            <a:schemeClr val="accent1"/>
+          </a:effectRef>
+          <a:fontRef idx="minor">
+            <a:schemeClr val="lt1"/>
+          </a:fontRef>
+        </p:style>
+        <p:txBody>
+          <a:bodyPr rtlCol="0" anchor="ctr"/>
+          <a:lstStyle/>
+          <a:p>
+            <a:pPr algn="ctr"/>
+            <a:r>
+              <a:rPr kumimoji="1" lang="en-US" altLang="ko-KR" smtClean="0"/>
+              <a:t>PosNeg</a:t>
+            </a:r>
+            <a:endParaRPr kumimoji="1" lang="ko-KR" altLang="en-US"/>
           </a:p>
         </p:txBody>
       </p:sp>
@@ -8019,7 +8024,7 @@
           <a:p>
             <a:r>
               <a:rPr lang="en-US" altLang="ko-KR" dirty="0" smtClean="0"/>
-              <a:t>IDEA</a:t>
+              <a:t>To-do Lists</a:t>
             </a:r>
             <a:endParaRPr lang="ko-KR" altLang="en-US" dirty="0"/>
           </a:p>
@@ -8033,8 +8038,8 @@
         </p:nvSpPr>
         <p:spPr>
           <a:xfrm>
-            <a:off x="1108884" y="2152949"/>
-            <a:ext cx="5094408" cy="2369880"/>
+            <a:off x="1145059" y="1169718"/>
+            <a:ext cx="7332585" cy="2000548"/>
           </a:xfrm>
           <a:prstGeom prst="rect">
             <a:avLst/>
@@ -8056,27 +8061,23 @@
             </a:pPr>
             <a:r>
               <a:rPr lang="ko-KR" altLang="en-US" sz="2000" dirty="0" smtClean="0"/>
-              <a:t>환자 소견 창에서 </a:t>
-            </a:r>
-            <a:r>
-              <a:rPr lang="en-US" altLang="ko-KR" sz="2000" dirty="0" smtClean="0"/>
-              <a:t>Atom</a:t>
+              <a:t>환자 </a:t>
+            </a:r>
+            <a:r>
+              <a:rPr lang="en-US" sz="2000" dirty="0" smtClean="0"/>
+              <a:t>Data</a:t>
             </a:r>
             <a:r>
               <a:rPr lang="ko-KR" altLang="en-US" sz="2000" dirty="0" smtClean="0"/>
-              <a:t>들을 강조</a:t>
-            </a:r>
-            <a:r>
-              <a:rPr lang="en-US" altLang="ko-KR" sz="2000" dirty="0" smtClean="0"/>
-              <a:t>(</a:t>
-            </a:r>
-            <a:r>
-              <a:rPr lang="en-US" altLang="ko-KR" sz="2000" dirty="0" err="1" smtClean="0"/>
-              <a:t>etc</a:t>
-            </a:r>
-            <a:r>
-              <a:rPr lang="en-US" altLang="ko-KR" sz="2000" dirty="0" smtClean="0"/>
-              <a:t> Bold)</a:t>
+              <a:t>를 위한</a:t>
+            </a:r>
+            <a:r>
+              <a:rPr lang="en-US" sz="2000" dirty="0" smtClean="0"/>
+              <a:t> Parser</a:t>
+            </a:r>
+            <a:r>
+              <a:rPr lang="ko-KR" altLang="en-US" sz="2000" dirty="0" smtClean="0"/>
+              <a:t> 프로그램 제작 필요</a:t>
             </a:r>
           </a:p>
           <a:p>
@@ -8085,8 +8086,20 @@
               <a:buChar char="•"/>
             </a:pPr>
             <a:r>
+              <a:rPr lang="en-US" sz="2000" dirty="0" smtClean="0"/>
+              <a:t>Rule Editor</a:t>
+            </a:r>
+            <a:r>
+              <a:rPr lang="ko-KR" altLang="en-US" sz="2000" dirty="0" smtClean="0"/>
+              <a:t> 부분에서 </a:t>
+            </a:r>
+            <a:r>
               <a:rPr lang="en-US" altLang="ko-KR" sz="2000" dirty="0" smtClean="0"/>
-              <a:t>Atom Navigator</a:t>
+              <a:t>Rule Auto Completion </a:t>
+            </a:r>
+            <a:r>
+              <a:rPr lang="ko-KR" altLang="en-US" sz="2000" dirty="0" smtClean="0"/>
+              <a:t>관련 부분 수정 필요</a:t>
             </a:r>
           </a:p>
           <a:p>
@@ -8095,8 +8108,24 @@
               <a:buChar char="•"/>
             </a:pPr>
             <a:r>
+              <a:rPr lang="en-US" sz="2000" dirty="0" err="1" smtClean="0"/>
+              <a:t>TestItem</a:t>
+            </a:r>
+            <a:r>
               <a:rPr lang="en-US" altLang="ko-KR" sz="2000" dirty="0" smtClean="0"/>
-              <a:t>Rule Navigator</a:t>
+              <a:t>(Atom)</a:t>
+            </a:r>
+            <a:r>
+              <a:rPr lang="ko-KR" altLang="en-US" sz="2000" dirty="0" smtClean="0"/>
+              <a:t> 별 </a:t>
+            </a:r>
+            <a:r>
+              <a:rPr lang="en-US" altLang="ko-KR" sz="2000" dirty="0" err="1" smtClean="0"/>
+              <a:t>StringValue</a:t>
+            </a:r>
+            <a:r>
+              <a:rPr lang="ko-KR" altLang="en-US" sz="2000" dirty="0" smtClean="0"/>
+              <a:t>에 대한 정의 필요</a:t>
             </a:r>
           </a:p>
           <a:p>
@@ -8105,12 +8134,16 @@
               <a:buChar char="•"/>
             </a:pPr>
             <a:r>
+              <a:rPr lang="ko-KR" altLang="en-US" sz="2000" dirty="0" smtClean="0"/>
+              <a:t>작성자 정보를 </a:t>
+            </a:r>
+            <a:r>
               <a:rPr lang="en-US" altLang="ko-KR" sz="2000" dirty="0" smtClean="0"/>
-              <a:t>Auto </a:t>
-            </a:r>
-            <a:r>
-              <a:rPr lang="en-US" altLang="ko-KR" sz="2000" dirty="0" smtClean="0"/>
-              <a:t>Save</a:t>
+              <a:t>Application</a:t>
+            </a:r>
+            <a:r>
+              <a:rPr lang="ko-KR" altLang="en-US" sz="2000" dirty="0" smtClean="0"/>
+              <a:t> 실행시 입력받을 수 있도록 수정</a:t>
             </a:r>
           </a:p>
           <a:p>
@@ -8119,16 +8152,21 @@
               <a:buChar char="•"/>
             </a:pPr>
             <a:r>
+              <a:rPr lang="en-US" sz="2000" dirty="0" smtClean="0"/>
+              <a:t> </a:t>
+            </a:r>
+            <a:r>
+              <a:rPr lang="en-US" sz="2000" dirty="0" err="1" smtClean="0"/>
+              <a:t>GraphView</a:t>
+            </a:r>
+            <a:r>
+              <a:rPr lang="en-US" sz="2000" dirty="0" smtClean="0"/>
+              <a:t> </a:t>
+            </a:r>
+            <a:r>
               <a:rPr lang="ko-KR" altLang="en-US" sz="2000" dirty="0" smtClean="0"/>
-              <a:t>한글 처리</a:t>
-            </a:r>
-            <a:r>
-              <a:rPr lang="en-US" altLang="ko-KR" sz="2000" dirty="0" smtClean="0"/>
-              <a:t>(UTF-8)</a:t>
-            </a:r>
-            <a:endParaRPr lang="en-US" altLang="ko-KR" sz="2000" dirty="0" smtClean="0"/>
-          </a:p>
-          <a:p>
+              <a:t>추가</a:t>
+            </a:r>
             <a:endParaRPr lang="en-US" sz="2400" dirty="0"/>
           </a:p>
         </p:txBody>
@@ -8136,7 +8174,7 @@
     </p:spTree>
     <p:extLst>
       <p:ext uri="{BB962C8B-B14F-4D97-AF65-F5344CB8AC3E}">
-        <p14:creationId xmlns:p14="http://schemas.microsoft.com/office/powerpoint/2010/main" val="297946044"/>
+        <p14:creationId xmlns:p14="http://schemas.microsoft.com/office/powerpoint/2010/main" val="272268905"/>
       </p:ext>
     </p:extLst>
   </p:cSld>
@@ -8187,11 +8225,7 @@
           <a:p>
             <a:r>
               <a:rPr lang="en-US" altLang="ko-KR" dirty="0" smtClean="0"/>
-              <a:t>Class Diagram </a:t>
-            </a:r>
-            <a:r>
-              <a:rPr lang="ko-KR" altLang="en-US" dirty="0" smtClean="0"/>
-              <a:t>추가할 점</a:t>
+              <a:t>IDEA</a:t>
             </a:r>
             <a:endParaRPr lang="ko-KR" altLang="en-US" dirty="0"/>
           </a:p>
@@ -8199,14 +8233,14 @@
       </p:sp>
       <p:sp>
         <p:nvSpPr>
-          <p:cNvPr id="3" name="TextBox 2"/>
+          <p:cNvPr id="5" name="TextBox 4"/>
           <p:cNvSpPr txBox="1"/>
           <p:nvPr/>
         </p:nvSpPr>
         <p:spPr>
           <a:xfrm>
-            <a:off x="951578" y="1589650"/>
-            <a:ext cx="5979329" cy="1200329"/>
+            <a:off x="1108884" y="2152949"/>
+            <a:ext cx="5094408" cy="2369880"/>
           </a:xfrm>
           <a:prstGeom prst="rect">
             <a:avLst/>
@@ -8219,25 +8253,36 @@
           </a:bodyPr>
           <a:lstStyle/>
           <a:p>
+            <a:endParaRPr lang="ko-KR" altLang="en-US" sz="2400" dirty="0" smtClean="0"/>
+          </a:p>
+          <a:p>
             <a:pPr marL="285750" indent="-285750">
               <a:buFont typeface="Arial" charset="0"/>
               <a:buChar char="•"/>
             </a:pPr>
             <a:r>
-              <a:rPr kumimoji="1" lang="en-US" altLang="ko-KR" dirty="0" err="1" smtClean="0"/>
-              <a:t>TestItem</a:t>
-            </a:r>
-            <a:r>
-              <a:rPr kumimoji="1" lang="ko-KR" altLang="en-US" dirty="0" smtClean="0"/>
-              <a:t>에 </a:t>
-            </a:r>
-            <a:r>
-              <a:rPr kumimoji="1" lang="en-US" altLang="ko-KR" dirty="0" smtClean="0"/>
-              <a:t>sub-item</a:t>
-            </a:r>
-            <a:r>
-              <a:rPr kumimoji="1" lang="ko-KR" altLang="en-US" dirty="0" smtClean="0"/>
-              <a:t>이 존재함</a:t>
+              <a:rPr lang="ko-KR" altLang="en-US" sz="2000" dirty="0" smtClean="0"/>
+              <a:t>환자 소견 창에서 </a:t>
+            </a:r>
+            <a:r>
+              <a:rPr lang="en-US" altLang="ko-KR" sz="2000" dirty="0" smtClean="0"/>
+              <a:t>Atom</a:t>
+            </a:r>
+            <a:r>
+              <a:rPr lang="ko-KR" altLang="en-US" sz="2000" dirty="0" smtClean="0"/>
+              <a:t>들을 강조</a:t>
+            </a:r>
+            <a:r>
+              <a:rPr lang="en-US" altLang="ko-KR" sz="2000" dirty="0" smtClean="0"/>
+              <a:t>(</a:t>
+            </a:r>
+            <a:r>
+              <a:rPr lang="en-US" altLang="ko-KR" sz="2000" dirty="0" err="1" smtClean="0"/>
+              <a:t>etc</a:t>
+            </a:r>
+            <a:r>
+              <a:rPr lang="en-US" altLang="ko-KR" sz="2000" dirty="0" smtClean="0"/>
+              <a:t> Bold)</a:t>
             </a:r>
           </a:p>
           <a:p>
@@ -8246,22 +8291,9 @@
               <a:buChar char="•"/>
             </a:pPr>
             <a:r>
-              <a:rPr kumimoji="1" lang="en-US" altLang="ko-KR" dirty="0" err="1" smtClean="0"/>
-              <a:t>TestValue</a:t>
-            </a:r>
-            <a:r>
-              <a:rPr kumimoji="1" lang="ko-KR" altLang="en-US" dirty="0" smtClean="0"/>
-              <a:t>의 </a:t>
-            </a:r>
-            <a:r>
-              <a:rPr kumimoji="1" lang="en-US" altLang="ko-KR" dirty="0" err="1" smtClean="0"/>
-              <a:t>StringValue</a:t>
-            </a:r>
-            <a:r>
-              <a:rPr kumimoji="1" lang="ko-KR" altLang="en-US" dirty="0" smtClean="0"/>
-              <a:t>에 대한 정확한 구현 범위가 필요</a:t>
-            </a:r>
-            <a:endParaRPr kumimoji="1" lang="ko-KR" altLang="en-US" dirty="0"/>
+              <a:rPr lang="en-US" altLang="ko-KR" sz="2000" dirty="0" smtClean="0"/>
+              <a:t>Atom Navigator</a:t>
+            </a:r>
           </a:p>
           <a:p>
             <a:pPr marL="285750" indent="-285750">
@@ -8269,20 +8301,8 @@
               <a:buChar char="•"/>
             </a:pPr>
             <a:r>
-              <a:rPr kumimoji="1" lang="en-US" altLang="ko-KR" dirty="0" err="1" smtClean="0"/>
-              <a:t>TestChecker</a:t>
-            </a:r>
-            <a:r>
-              <a:rPr kumimoji="1" lang="ko-KR" altLang="en-US" dirty="0" smtClean="0"/>
-              <a:t>와 </a:t>
-            </a:r>
-            <a:r>
-              <a:rPr kumimoji="1" lang="en-US" altLang="ko-KR" dirty="0" err="1" smtClean="0"/>
-              <a:t>TestDomain</a:t>
-            </a:r>
-            <a:r>
-              <a:rPr kumimoji="1" lang="ko-KR" altLang="en-US" dirty="0" smtClean="0"/>
-              <a:t> 구현 필요</a:t>
+              <a:rPr lang="en-US" altLang="ko-KR" sz="2000" dirty="0" smtClean="0"/>
+              <a:t>Rule Navigator</a:t>
             </a:r>
           </a:p>
           <a:p>
@@ -8291,37 +8311,33 @@
               <a:buChar char="•"/>
             </a:pPr>
             <a:r>
-              <a:rPr kumimoji="1" lang="en-US" altLang="ko-KR" dirty="0" smtClean="0"/>
-              <a:t>Rule</a:t>
-            </a:r>
-            <a:r>
-              <a:rPr kumimoji="1" lang="ko-KR" altLang="en-US" dirty="0" smtClean="0"/>
-              <a:t>의 </a:t>
-            </a:r>
-            <a:r>
-              <a:rPr kumimoji="1" lang="en-US" altLang="ko-KR" dirty="0" smtClean="0"/>
-              <a:t>Atom</a:t>
-            </a:r>
-            <a:r>
-              <a:rPr kumimoji="1" lang="ko-KR" altLang="en-US" dirty="0" smtClean="0"/>
-              <a:t>마다 </a:t>
-            </a:r>
-            <a:r>
-              <a:rPr kumimoji="1" lang="en-US" altLang="ko-KR" dirty="0" err="1" smtClean="0"/>
-              <a:t>StringValue</a:t>
-            </a:r>
-            <a:r>
-              <a:rPr kumimoji="1" lang="ko-KR" altLang="en-US" dirty="0" smtClean="0"/>
-              <a:t>를 설정할 수 있도록 수정</a:t>
-            </a:r>
-            <a:endParaRPr kumimoji="1" lang="ko-KR" altLang="en-US" dirty="0"/>
+              <a:rPr lang="en-US" altLang="ko-KR" sz="2000" dirty="0" smtClean="0"/>
+              <a:t>Auto Save</a:t>
+            </a:r>
+          </a:p>
+          <a:p>
+            <a:pPr marL="285750" indent="-285750">
+              <a:buFont typeface="Arial" charset="0"/>
+              <a:buChar char="•"/>
+            </a:pPr>
+            <a:r>
+              <a:rPr lang="ko-KR" altLang="en-US" sz="2000" dirty="0" smtClean="0"/>
+              <a:t>한글 처리</a:t>
+            </a:r>
+            <a:r>
+              <a:rPr lang="en-US" altLang="ko-KR" sz="2000" dirty="0" smtClean="0"/>
+              <a:t>(UTF-8)</a:t>
+            </a:r>
+          </a:p>
+          <a:p>
+            <a:endParaRPr lang="en-US" sz="2400" dirty="0"/>
           </a:p>
         </p:txBody>
       </p:sp>
     </p:spTree>
     <p:extLst>
       <p:ext uri="{BB962C8B-B14F-4D97-AF65-F5344CB8AC3E}">
-        <p14:creationId xmlns:p14="http://schemas.microsoft.com/office/powerpoint/2010/main" val="2095252334"/>
+        <p14:creationId xmlns:p14="http://schemas.microsoft.com/office/powerpoint/2010/main" val="297946044"/>
       </p:ext>
     </p:extLst>
   </p:cSld>
@@ -8371,12 +8387,12 @@
           <a:lstStyle/>
           <a:p>
             <a:r>
+              <a:rPr lang="en-US" altLang="ko-KR" dirty="0" smtClean="0"/>
+              <a:t>Class Diagram </a:t>
+            </a:r>
+            <a:r>
               <a:rPr lang="ko-KR" altLang="en-US" dirty="0" smtClean="0"/>
-              <a:t>참고할만한 </a:t>
-            </a:r>
-            <a:r>
-              <a:rPr lang="en-US" altLang="ko-KR" dirty="0" smtClean="0"/>
-              <a:t>Library</a:t>
+              <a:t>추가할 점</a:t>
             </a:r>
             <a:endParaRPr lang="ko-KR" altLang="en-US" dirty="0"/>
           </a:p>
@@ -8390,8 +8406,8 @@
         </p:nvSpPr>
         <p:spPr>
           <a:xfrm>
-            <a:off x="752255" y="1559002"/>
-            <a:ext cx="5690469" cy="1754326"/>
+            <a:off x="951578" y="1589650"/>
+            <a:ext cx="5979329" cy="1200329"/>
           </a:xfrm>
           <a:prstGeom prst="rect">
             <a:avLst/>
@@ -8409,65 +8425,21 @@
               <a:buChar char="•"/>
             </a:pPr>
             <a:r>
+              <a:rPr kumimoji="1" lang="en-US" altLang="ko-KR" dirty="0" err="1" smtClean="0"/>
+              <a:t>TestItem</a:t>
+            </a:r>
+            <a:r>
+              <a:rPr kumimoji="1" lang="ko-KR" altLang="en-US" dirty="0" smtClean="0"/>
+              <a:t>에 </a:t>
+            </a:r>
+            <a:r>
               <a:rPr kumimoji="1" lang="en-US" altLang="ko-KR" dirty="0" smtClean="0"/>
-              <a:t>Controls FX</a:t>
+              <a:t>sub-item</a:t>
             </a:r>
             <a:r>
               <a:rPr kumimoji="1" lang="ko-KR" altLang="en-US" dirty="0" smtClean="0"/>
-              <a:t> </a:t>
-            </a:r>
-            <a:r>
-              <a:rPr kumimoji="1" lang="en-US" altLang="ko-KR" dirty="0" smtClean="0"/>
-              <a:t>:</a:t>
-            </a:r>
-            <a:r>
-              <a:rPr kumimoji="1" lang="ko-KR" altLang="en-US" dirty="0" smtClean="0"/>
-              <a:t> </a:t>
-            </a:r>
-            <a:r>
-              <a:rPr kumimoji="1" lang="ko-KR" altLang="en-US" dirty="0" smtClean="0"/>
-              <a:t>좋은 </a:t>
-            </a:r>
-            <a:r>
-              <a:rPr kumimoji="1" lang="en-US" altLang="ko-KR" dirty="0" err="1" smtClean="0"/>
-              <a:t>JavaFX</a:t>
-            </a:r>
-            <a:r>
-              <a:rPr kumimoji="1" lang="en-US" altLang="ko-KR" dirty="0" smtClean="0"/>
-              <a:t> </a:t>
-            </a:r>
-            <a:r>
-              <a:rPr kumimoji="1" lang="en-US" altLang="ko-KR" dirty="0" smtClean="0"/>
-              <a:t>Control</a:t>
-            </a:r>
-            <a:r>
-              <a:rPr kumimoji="1" lang="ko-KR" altLang="en-US" dirty="0" smtClean="0"/>
-              <a:t>을 모아놓은 </a:t>
-            </a:r>
-            <a:r>
-              <a:rPr kumimoji="1" lang="en-US" altLang="ko-KR" dirty="0" smtClean="0"/>
-              <a:t>Library</a:t>
-            </a:r>
-            <a:endParaRPr kumimoji="1" lang="en-US" altLang="ko-KR" dirty="0" smtClean="0"/>
-          </a:p>
-          <a:p>
-            <a:pPr marL="742950" lvl="1" indent="-285750">
-              <a:buFont typeface="Arial" charset="0"/>
-              <a:buChar char="•"/>
-            </a:pPr>
-            <a:r>
-              <a:rPr kumimoji="1" lang="en-US" altLang="ko-KR" dirty="0">
-                <a:hlinkClick r:id="rId2"/>
-              </a:rPr>
-              <a:t>http://fxexperience.com/controlsfx</a:t>
-            </a:r>
-            <a:r>
-              <a:rPr kumimoji="1" lang="en-US" altLang="ko-KR" dirty="0" smtClean="0">
-                <a:hlinkClick r:id="rId2"/>
-              </a:rPr>
-              <a:t>/</a:t>
-            </a:r>
-            <a:endParaRPr kumimoji="1" lang="ko-KR" altLang="en-US" dirty="0" smtClean="0"/>
+              <a:t>이 존재함</a:t>
+            </a:r>
           </a:p>
           <a:p>
             <a:pPr marL="285750" indent="-285750">
@@ -8475,77 +8447,74 @@
               <a:buChar char="•"/>
             </a:pPr>
             <a:r>
-              <a:rPr kumimoji="1" lang="en-US" altLang="ko-KR" dirty="0" smtClean="0"/>
-              <a:t>Apache </a:t>
-            </a:r>
-            <a:r>
               <a:rPr kumimoji="1" lang="en-US" altLang="ko-KR" dirty="0" err="1" smtClean="0"/>
-              <a:t>Lucene</a:t>
-            </a:r>
-            <a:r>
-              <a:rPr kumimoji="1" lang="en-US" altLang="ko-KR" dirty="0" smtClean="0"/>
-              <a:t> : </a:t>
-            </a:r>
-            <a:r>
-              <a:rPr lang="ko-KR" altLang="de-DE" dirty="0"/>
-              <a:t>확장 가능한 고성능 </a:t>
-            </a:r>
-            <a:r>
-              <a:rPr lang="ko-KR" altLang="de-DE" dirty="0" smtClean="0"/>
-              <a:t>정보검색</a:t>
-            </a:r>
-            <a:r>
-              <a:rPr lang="de-DE" altLang="ko-KR" dirty="0"/>
-              <a:t> </a:t>
-            </a:r>
-            <a:r>
-              <a:rPr lang="de-DE" altLang="ko-KR" dirty="0" smtClean="0"/>
-              <a:t>Library</a:t>
-            </a:r>
-          </a:p>
-          <a:p>
-            <a:pPr marL="742950" lvl="1" indent="-285750">
+              <a:t>TestValue</a:t>
+            </a:r>
+            <a:r>
+              <a:rPr kumimoji="1" lang="ko-KR" altLang="en-US" dirty="0" smtClean="0"/>
+              <a:t>의 </a:t>
+            </a:r>
+            <a:r>
+              <a:rPr kumimoji="1" lang="en-US" altLang="ko-KR" dirty="0" err="1" smtClean="0"/>
+              <a:t>StringValue</a:t>
+            </a:r>
+            <a:r>
+              <a:rPr kumimoji="1" lang="ko-KR" altLang="en-US" dirty="0" smtClean="0"/>
+              <a:t>에 대한 정확한 구현 범위가 필요</a:t>
+            </a:r>
+            <a:endParaRPr kumimoji="1" lang="ko-KR" altLang="en-US" dirty="0"/>
+          </a:p>
+          <a:p>
+            <a:pPr marL="285750" indent="-285750">
               <a:buFont typeface="Arial" charset="0"/>
               <a:buChar char="•"/>
             </a:pPr>
             <a:r>
-              <a:rPr kumimoji="1" lang="de-DE" altLang="ko-KR" dirty="0">
-                <a:hlinkClick r:id="rId3"/>
-              </a:rPr>
-              <a:t>http://</a:t>
-            </a:r>
-            <a:r>
-              <a:rPr kumimoji="1" lang="de-DE" altLang="ko-KR" dirty="0" smtClean="0">
-                <a:hlinkClick r:id="rId3"/>
-              </a:rPr>
-              <a:t>linuxism.tistory.com/898</a:t>
-            </a:r>
-            <a:endParaRPr kumimoji="1" lang="de-DE" altLang="ko-KR" dirty="0" smtClean="0"/>
-          </a:p>
-          <a:p>
-            <a:pPr marL="742950" lvl="1" indent="-285750">
+              <a:rPr kumimoji="1" lang="en-US" altLang="ko-KR" dirty="0" err="1" smtClean="0"/>
+              <a:t>TestChecker</a:t>
+            </a:r>
+            <a:r>
+              <a:rPr kumimoji="1" lang="ko-KR" altLang="en-US" dirty="0" smtClean="0"/>
+              <a:t>와 </a:t>
+            </a:r>
+            <a:r>
+              <a:rPr kumimoji="1" lang="en-US" altLang="ko-KR" dirty="0" err="1" smtClean="0"/>
+              <a:t>TestDomain</a:t>
+            </a:r>
+            <a:r>
+              <a:rPr kumimoji="1" lang="ko-KR" altLang="en-US" dirty="0" smtClean="0"/>
+              <a:t> 구현 필요</a:t>
+            </a:r>
+          </a:p>
+          <a:p>
+            <a:pPr marL="285750" indent="-285750">
               <a:buFont typeface="Arial" charset="0"/>
               <a:buChar char="•"/>
             </a:pPr>
             <a:r>
-              <a:rPr kumimoji="1" lang="de-DE" altLang="ko-KR" dirty="0">
-                <a:hlinkClick r:id="rId4"/>
-              </a:rPr>
-              <a:t>http://</a:t>
-            </a:r>
-            <a:r>
-              <a:rPr kumimoji="1" lang="de-DE" altLang="ko-KR" dirty="0" smtClean="0">
-                <a:hlinkClick r:id="rId4"/>
-              </a:rPr>
-              <a:t>lucene.apache.org</a:t>
-            </a:r>
-            <a:endParaRPr kumimoji="1" lang="de-DE" altLang="ko-KR" dirty="0" smtClean="0"/>
-          </a:p>
-          <a:p>
-            <a:pPr marL="742950" lvl="1" indent="-285750">
-              <a:buFont typeface="Arial" charset="0"/>
-              <a:buChar char="•"/>
-            </a:pPr>
+              <a:rPr kumimoji="1" lang="en-US" altLang="ko-KR" dirty="0" smtClean="0"/>
+              <a:t>Rule</a:t>
+            </a:r>
+            <a:r>
+              <a:rPr kumimoji="1" lang="ko-KR" altLang="en-US" dirty="0" smtClean="0"/>
+              <a:t>의 </a:t>
+            </a:r>
+            <a:r>
+              <a:rPr kumimoji="1" lang="en-US" altLang="ko-KR" dirty="0" smtClean="0"/>
+              <a:t>Atom</a:t>
+            </a:r>
+            <a:r>
+              <a:rPr kumimoji="1" lang="ko-KR" altLang="en-US" dirty="0" smtClean="0"/>
+              <a:t>마다 </a:t>
+            </a:r>
+            <a:r>
+              <a:rPr kumimoji="1" lang="en-US" altLang="ko-KR" dirty="0" err="1" smtClean="0"/>
+              <a:t>StringValue</a:t>
+            </a:r>
+            <a:r>
+              <a:rPr kumimoji="1" lang="ko-KR" altLang="en-US" dirty="0" smtClean="0"/>
+              <a:t>를 설정할 수 있도록 수정</a:t>
+            </a:r>
             <a:endParaRPr kumimoji="1" lang="ko-KR" altLang="en-US" dirty="0"/>
           </a:p>
         </p:txBody>
@@ -8553,7 +8522,7 @@
     </p:spTree>
     <p:extLst>
       <p:ext uri="{BB962C8B-B14F-4D97-AF65-F5344CB8AC3E}">
-        <p14:creationId xmlns:p14="http://schemas.microsoft.com/office/powerpoint/2010/main" val="555290893"/>
+        <p14:creationId xmlns:p14="http://schemas.microsoft.com/office/powerpoint/2010/main" val="2095252334"/>
       </p:ext>
     </p:extLst>
   </p:cSld>
@@ -8589,6 +8558,229 @@
       </p:grpSpPr>
       <p:sp>
         <p:nvSpPr>
+          <p:cNvPr id="2" name="제목 1"/>
+          <p:cNvSpPr>
+            <a:spLocks noGrp="1"/>
+          </p:cNvSpPr>
+          <p:nvPr>
+            <p:ph type="title"/>
+          </p:nvPr>
+        </p:nvSpPr>
+        <p:spPr/>
+        <p:txBody>
+          <a:bodyPr/>
+          <a:lstStyle/>
+          <a:p>
+            <a:r>
+              <a:rPr lang="ko-KR" altLang="en-US" dirty="0" smtClean="0"/>
+              <a:t>참고할만한 </a:t>
+            </a:r>
+            <a:r>
+              <a:rPr lang="en-US" altLang="ko-KR" dirty="0" smtClean="0"/>
+              <a:t>Library</a:t>
+            </a:r>
+            <a:endParaRPr lang="ko-KR" altLang="en-US" dirty="0"/>
+          </a:p>
+        </p:txBody>
+      </p:sp>
+      <p:sp>
+        <p:nvSpPr>
+          <p:cNvPr id="3" name="TextBox 2"/>
+          <p:cNvSpPr txBox="1"/>
+          <p:nvPr/>
+        </p:nvSpPr>
+        <p:spPr>
+          <a:xfrm>
+            <a:off x="752255" y="1559002"/>
+            <a:ext cx="5690469" cy="1754326"/>
+          </a:xfrm>
+          <a:prstGeom prst="rect">
+            <a:avLst/>
+          </a:prstGeom>
+          <a:noFill/>
+        </p:spPr>
+        <p:txBody>
+          <a:bodyPr wrap="none" rtlCol="0">
+            <a:spAutoFit/>
+          </a:bodyPr>
+          <a:lstStyle/>
+          <a:p>
+            <a:pPr marL="285750" indent="-285750">
+              <a:buFont typeface="Arial" charset="0"/>
+              <a:buChar char="•"/>
+            </a:pPr>
+            <a:r>
+              <a:rPr kumimoji="1" lang="en-US" altLang="ko-KR" dirty="0" smtClean="0"/>
+              <a:t>Controls FX</a:t>
+            </a:r>
+            <a:r>
+              <a:rPr kumimoji="1" lang="ko-KR" altLang="en-US" dirty="0" smtClean="0"/>
+              <a:t> </a:t>
+            </a:r>
+            <a:r>
+              <a:rPr kumimoji="1" lang="en-US" altLang="ko-KR" dirty="0" smtClean="0"/>
+              <a:t>:</a:t>
+            </a:r>
+            <a:r>
+              <a:rPr kumimoji="1" lang="ko-KR" altLang="en-US" dirty="0" smtClean="0"/>
+              <a:t> 좋은 </a:t>
+            </a:r>
+            <a:r>
+              <a:rPr kumimoji="1" lang="en-US" altLang="ko-KR" dirty="0" err="1" smtClean="0"/>
+              <a:t>JavaFX</a:t>
+            </a:r>
+            <a:r>
+              <a:rPr kumimoji="1" lang="en-US" altLang="ko-KR" dirty="0" smtClean="0"/>
+              <a:t> Control</a:t>
+            </a:r>
+            <a:r>
+              <a:rPr kumimoji="1" lang="ko-KR" altLang="en-US" dirty="0" smtClean="0"/>
+              <a:t>을 모아놓은 </a:t>
+            </a:r>
+            <a:r>
+              <a:rPr kumimoji="1" lang="en-US" altLang="ko-KR" dirty="0" smtClean="0"/>
+              <a:t>Library</a:t>
+            </a:r>
+          </a:p>
+          <a:p>
+            <a:pPr marL="742950" lvl="1" indent="-285750">
+              <a:buFont typeface="Arial" charset="0"/>
+              <a:buChar char="•"/>
+            </a:pPr>
+            <a:r>
+              <a:rPr kumimoji="1" lang="en-US" altLang="ko-KR" dirty="0">
+                <a:hlinkClick r:id="rId2"/>
+              </a:rPr>
+              <a:t>http://fxexperience.com/controlsfx</a:t>
+            </a:r>
+            <a:r>
+              <a:rPr kumimoji="1" lang="en-US" altLang="ko-KR" dirty="0" smtClean="0">
+                <a:hlinkClick r:id="rId2"/>
+              </a:rPr>
+              <a:t>/</a:t>
+            </a:r>
+            <a:endParaRPr kumimoji="1" lang="ko-KR" altLang="en-US" dirty="0" smtClean="0"/>
+          </a:p>
+          <a:p>
+            <a:pPr marL="285750" indent="-285750">
+              <a:buFont typeface="Arial" charset="0"/>
+              <a:buChar char="•"/>
+            </a:pPr>
+            <a:r>
+              <a:rPr kumimoji="1" lang="en-US" altLang="ko-KR" dirty="0" smtClean="0"/>
+              <a:t>Apache </a:t>
+            </a:r>
+            <a:r>
+              <a:rPr kumimoji="1" lang="en-US" altLang="ko-KR" dirty="0" err="1" smtClean="0"/>
+              <a:t>Lucene</a:t>
+            </a:r>
+            <a:r>
+              <a:rPr kumimoji="1" lang="en-US" altLang="ko-KR" dirty="0" smtClean="0"/>
+              <a:t> : </a:t>
+            </a:r>
+            <a:r>
+              <a:rPr lang="ko-KR" altLang="de-DE" dirty="0"/>
+              <a:t>확장 가능한 고성능 </a:t>
+            </a:r>
+            <a:r>
+              <a:rPr lang="ko-KR" altLang="de-DE" dirty="0" smtClean="0"/>
+              <a:t>정보검색</a:t>
+            </a:r>
+            <a:r>
+              <a:rPr lang="de-DE" altLang="ko-KR" dirty="0"/>
+              <a:t> </a:t>
+            </a:r>
+            <a:r>
+              <a:rPr lang="de-DE" altLang="ko-KR" dirty="0" smtClean="0"/>
+              <a:t>Library</a:t>
+            </a:r>
+          </a:p>
+          <a:p>
+            <a:pPr marL="742950" lvl="1" indent="-285750">
+              <a:buFont typeface="Arial" charset="0"/>
+              <a:buChar char="•"/>
+            </a:pPr>
+            <a:r>
+              <a:rPr kumimoji="1" lang="de-DE" altLang="ko-KR" dirty="0">
+                <a:hlinkClick r:id="rId3"/>
+              </a:rPr>
+              <a:t>http://</a:t>
+            </a:r>
+            <a:r>
+              <a:rPr kumimoji="1" lang="de-DE" altLang="ko-KR" dirty="0" smtClean="0">
+                <a:hlinkClick r:id="rId3"/>
+              </a:rPr>
+              <a:t>linuxism.tistory.com/898</a:t>
+            </a:r>
+            <a:endParaRPr kumimoji="1" lang="de-DE" altLang="ko-KR" dirty="0" smtClean="0"/>
+          </a:p>
+          <a:p>
+            <a:pPr marL="742950" lvl="1" indent="-285750">
+              <a:buFont typeface="Arial" charset="0"/>
+              <a:buChar char="•"/>
+            </a:pPr>
+            <a:r>
+              <a:rPr kumimoji="1" lang="de-DE" altLang="ko-KR" dirty="0">
+                <a:hlinkClick r:id="rId4"/>
+              </a:rPr>
+              <a:t>http://</a:t>
+            </a:r>
+            <a:r>
+              <a:rPr kumimoji="1" lang="de-DE" altLang="ko-KR" dirty="0" smtClean="0">
+                <a:hlinkClick r:id="rId4"/>
+              </a:rPr>
+              <a:t>lucene.apache.org</a:t>
+            </a:r>
+            <a:endParaRPr kumimoji="1" lang="de-DE" altLang="ko-KR" dirty="0" smtClean="0"/>
+          </a:p>
+          <a:p>
+            <a:pPr marL="742950" lvl="1" indent="-285750">
+              <a:buFont typeface="Arial" charset="0"/>
+              <a:buChar char="•"/>
+            </a:pPr>
+            <a:endParaRPr kumimoji="1" lang="ko-KR" altLang="en-US" dirty="0"/>
+          </a:p>
+        </p:txBody>
+      </p:sp>
+    </p:spTree>
+    <p:extLst>
+      <p:ext uri="{BB962C8B-B14F-4D97-AF65-F5344CB8AC3E}">
+        <p14:creationId xmlns:p14="http://schemas.microsoft.com/office/powerpoint/2010/main" val="555290893"/>
+      </p:ext>
+    </p:extLst>
+  </p:cSld>
+  <p:clrMapOvr>
+    <a:masterClrMapping/>
+  </p:clrMapOvr>
+  <p:timing>
+    <p:tnLst>
+      <p:par>
+        <p:cTn id="1" dur="indefinite" restart="never" nodeType="tmRoot"/>
+      </p:par>
+    </p:tnLst>
+  </p:timing>
+</p:sld>
+</file>
+
+<file path=ppt/slides/slide7.xml><?xml version="1.0" encoding="utf-8"?>
+<p:sld xmlns:a="http://schemas.openxmlformats.org/drawingml/2006/main" xmlns:r="http://schemas.openxmlformats.org/officeDocument/2006/relationships" xmlns:p="http://schemas.openxmlformats.org/presentationml/2006/main">
+  <p:cSld>
+    <p:spTree>
+      <p:nvGrpSpPr>
+        <p:cNvPr id="1" name=""/>
+        <p:cNvGrpSpPr/>
+        <p:nvPr/>
+      </p:nvGrpSpPr>
+      <p:grpSpPr>
+        <a:xfrm>
+          <a:off x="0" y="0"/>
+          <a:ext cx="0" cy="0"/>
+          <a:chOff x="0" y="0"/>
+          <a:chExt cx="0" cy="0"/>
+        </a:xfrm>
+      </p:grpSpPr>
+      <p:sp>
+        <p:nvSpPr>
           <p:cNvPr id="2" name="Text Placeholder 1"/>
           <p:cNvSpPr>
             <a:spLocks noGrp="1"/>
@@ -8706,7 +8898,7 @@
 </p:sld>
 </file>
 
-<file path=ppt/slides/slide7.xml><?xml version="1.0" encoding="utf-8"?>
+<file path=ppt/slides/slide8.xml><?xml version="1.0" encoding="utf-8"?>
 <p:sld xmlns:a="http://schemas.openxmlformats.org/drawingml/2006/main" xmlns:r="http://schemas.openxmlformats.org/officeDocument/2006/relationships" xmlns:p="http://schemas.openxmlformats.org/presentationml/2006/main">
   <p:cSld>
     <p:spTree>
@@ -8808,7 +9000,7 @@
 </p:sld>
 </file>
 
-<file path=ppt/slides/slide8.xml><?xml version="1.0" encoding="utf-8"?>
+<file path=ppt/slides/slide9.xml><?xml version="1.0" encoding="utf-8"?>
 <p:sld xmlns:a="http://schemas.openxmlformats.org/drawingml/2006/main" xmlns:r="http://schemas.openxmlformats.org/officeDocument/2006/relationships" xmlns:p="http://schemas.openxmlformats.org/presentationml/2006/main">
   <p:cSld>
     <p:spTree>
@@ -9036,108 +9228,6 @@
     <p:extLst>
       <p:ext uri="{BB962C8B-B14F-4D97-AF65-F5344CB8AC3E}">
         <p14:creationId xmlns:p14="http://schemas.microsoft.com/office/powerpoint/2010/main" val="1947346619"/>
-      </p:ext>
-    </p:extLst>
-  </p:cSld>
-  <p:clrMapOvr>
-    <a:masterClrMapping/>
-  </p:clrMapOvr>
-  <p:timing>
-    <p:tnLst>
-      <p:par>
-        <p:cTn id="1" dur="indefinite" restart="never" nodeType="tmRoot"/>
-      </p:par>
-    </p:tnLst>
-  </p:timing>
-</p:sld>
-</file>
-
-<file path=ppt/slides/slide9.xml><?xml version="1.0" encoding="utf-8"?>
-<p:sld xmlns:a="http://schemas.openxmlformats.org/drawingml/2006/main" xmlns:r="http://schemas.openxmlformats.org/officeDocument/2006/relationships" xmlns:p="http://schemas.openxmlformats.org/presentationml/2006/main">
-  <p:cSld>
-    <p:spTree>
-      <p:nvGrpSpPr>
-        <p:cNvPr id="1" name=""/>
-        <p:cNvGrpSpPr/>
-        <p:nvPr/>
-      </p:nvGrpSpPr>
-      <p:grpSpPr>
-        <a:xfrm>
-          <a:off x="0" y="0"/>
-          <a:ext cx="0" cy="0"/>
-          <a:chOff x="0" y="0"/>
-          <a:chExt cx="0" cy="0"/>
-        </a:xfrm>
-      </p:grpSpPr>
-      <p:sp>
-        <p:nvSpPr>
-          <p:cNvPr id="2" name="제목 1"/>
-          <p:cNvSpPr>
-            <a:spLocks noGrp="1"/>
-          </p:cNvSpPr>
-          <p:nvPr>
-            <p:ph type="title"/>
-          </p:nvPr>
-        </p:nvSpPr>
-        <p:spPr/>
-        <p:txBody>
-          <a:bodyPr/>
-          <a:lstStyle/>
-          <a:p>
-            <a:r>
-              <a:rPr lang="en-US" altLang="ko-KR" dirty="0" smtClean="0"/>
-              <a:t>GUI </a:t>
-            </a:r>
-            <a:r>
-              <a:rPr lang="ko-KR" altLang="en-US" dirty="0" smtClean="0"/>
-              <a:t>가이드 라인 </a:t>
-            </a:r>
-            <a:r>
-              <a:rPr lang="en-US" altLang="ko-KR" dirty="0" err="1" smtClean="0"/>
-              <a:t>Ver</a:t>
-            </a:r>
-            <a:r>
-              <a:rPr lang="en-US" altLang="ko-KR" dirty="0" smtClean="0"/>
-              <a:t> 0.3 [3]</a:t>
-            </a:r>
-            <a:endParaRPr lang="ko-KR" altLang="en-US" dirty="0"/>
-          </a:p>
-        </p:txBody>
-      </p:sp>
-      <p:pic>
-        <p:nvPicPr>
-          <p:cNvPr id="4" name="Picture 3"/>
-          <p:cNvPicPr>
-            <a:picLocks noChangeAspect="1"/>
-          </p:cNvPicPr>
-          <p:nvPr/>
-        </p:nvPicPr>
-        <p:blipFill>
-          <a:blip r:embed="rId2">
-            <a:extLst>
-              <a:ext uri="{28A0092B-C50C-407E-A947-70E740481C1C}">
-                <a14:useLocalDpi xmlns:a14="http://schemas.microsoft.com/office/drawing/2010/main" val="0"/>
-              </a:ext>
-            </a:extLst>
-          </a:blip>
-          <a:stretch>
-            <a:fillRect/>
-          </a:stretch>
-        </p:blipFill>
-        <p:spPr>
-          <a:xfrm>
-            <a:off x="2730500" y="1562100"/>
-            <a:ext cx="6718300" cy="3721100"/>
-          </a:xfrm>
-          <a:prstGeom prst="rect">
-            <a:avLst/>
-          </a:prstGeom>
-        </p:spPr>
-      </p:pic>
-    </p:spTree>
-    <p:extLst>
-      <p:ext uri="{BB962C8B-B14F-4D97-AF65-F5344CB8AC3E}">
-        <p14:creationId xmlns:p14="http://schemas.microsoft.com/office/powerpoint/2010/main" val="498777856"/>
       </p:ext>
     </p:extLst>
   </p:cSld>

</xml_diff>